<commit_message>
Update conteúdo aula 03
</commit_message>
<xml_diff>
--- a/aula-03/material/Aula03.pptx
+++ b/aula-03/material/Aula03.pptx
@@ -8,11 +8,6 @@
     <p:sldId id="256" r:id="rId2"/>
     <p:sldId id="270" r:id="rId3"/>
     <p:sldId id="272" r:id="rId4"/>
-    <p:sldId id="271" r:id="rId5"/>
-    <p:sldId id="274" r:id="rId6"/>
-    <p:sldId id="273" r:id="rId7"/>
-    <p:sldId id="275" r:id="rId8"/>
-    <p:sldId id="276" r:id="rId9"/>
   </p:sldIdLst>
   <p:sldSz cx="12192000" cy="6858000"/>
   <p:notesSz cx="6858000" cy="9144000"/>
@@ -119,11 +114,6 @@
             <p14:sldId id="256"/>
             <p14:sldId id="270"/>
             <p14:sldId id="272"/>
-            <p14:sldId id="271"/>
-            <p14:sldId id="274"/>
-            <p14:sldId id="273"/>
-            <p14:sldId id="275"/>
-            <p14:sldId id="276"/>
           </p14:sldIdLst>
         </p14:section>
       </p14:sectionLst>
@@ -4793,6 +4783,59 @@
           <a:lstStyle/>
           <a:p>
             <a:r>
+              <a:rPr lang="en-US" dirty="0" err="1">
+                <a:solidFill>
+                  <a:schemeClr val="bg1"/>
+                </a:solidFill>
+              </a:rPr>
+              <a:t>Revisão</a:t>
+            </a:r>
+            <a:r>
+              <a:rPr lang="en-US" dirty="0">
+                <a:solidFill>
+                  <a:schemeClr val="bg1"/>
+                </a:solidFill>
+              </a:rPr>
+              <a:t> das duas aulas </a:t>
+            </a:r>
+            <a:r>
+              <a:rPr lang="en-US" dirty="0" err="1">
+                <a:solidFill>
+                  <a:schemeClr val="bg1"/>
+                </a:solidFill>
+              </a:rPr>
+              <a:t>anteriores</a:t>
+            </a:r>
+            <a:r>
+              <a:rPr lang="en-US" dirty="0">
+                <a:solidFill>
+                  <a:schemeClr val="bg1"/>
+                </a:solidFill>
+              </a:rPr>
+              <a:t>…</a:t>
+            </a:r>
+          </a:p>
+          <a:p>
+            <a:pPr marL="457200" lvl="1" indent="0">
+              <a:buNone/>
+            </a:pPr>
+            <a:r>
+              <a:rPr lang="en-US" dirty="0">
+                <a:solidFill>
+                  <a:schemeClr val="bg1"/>
+                </a:solidFill>
+                <a:hlinkClick r:id="rId2"/>
+              </a:rPr>
+              <a:t>https://emersoninocente.github.io/SENAC67-UC15_202309/aula-03/material/aula03-revisao.html</a:t>
+            </a:r>
+            <a:endParaRPr lang="en-US" dirty="0">
+              <a:solidFill>
+                <a:schemeClr val="bg1"/>
+              </a:solidFill>
+            </a:endParaRPr>
+          </a:p>
+          <a:p>
+            <a:r>
               <a:rPr lang="en-US" dirty="0">
                 <a:solidFill>
                   <a:schemeClr val="bg1"/>
@@ -4814,15 +4857,93 @@
                   <a:schemeClr val="bg1"/>
                 </a:solidFill>
               </a:rPr>
-              <a:t> como funciona o processo de </a:t>
-            </a:r>
-            <a:r>
-              <a:rPr lang="pt-BR">
+              <a:t> como funciona o processo de uma URL</a:t>
+            </a:r>
+          </a:p>
+          <a:p>
+            <a:r>
+              <a:rPr lang="pt-BR" dirty="0">
                 <a:solidFill>
                   <a:schemeClr val="bg1"/>
                 </a:solidFill>
               </a:rPr>
-              <a:t>uma URL</a:t>
+              <a:t>Verificar principais </a:t>
+            </a:r>
+            <a:r>
+              <a:rPr lang="pt-BR" dirty="0" err="1">
+                <a:solidFill>
+                  <a:schemeClr val="bg1"/>
+                </a:solidFill>
+              </a:rPr>
+              <a:t>tag</a:t>
+            </a:r>
+            <a:r>
+              <a:rPr lang="pt-BR" dirty="0">
+                <a:solidFill>
+                  <a:schemeClr val="bg1"/>
+                </a:solidFill>
+              </a:rPr>
+              <a:t> de formatação de texto</a:t>
+            </a:r>
+          </a:p>
+          <a:p>
+            <a:r>
+              <a:rPr lang="pt-BR" dirty="0">
+                <a:solidFill>
+                  <a:schemeClr val="bg1"/>
+                </a:solidFill>
+              </a:rPr>
+              <a:t>Entender a implementação de </a:t>
+            </a:r>
+            <a:r>
+              <a:rPr lang="pt-BR" i="1" dirty="0" err="1">
+                <a:solidFill>
+                  <a:schemeClr val="bg1"/>
+                </a:solidFill>
+              </a:rPr>
+              <a:t>style</a:t>
+            </a:r>
+            <a:r>
+              <a:rPr lang="pt-BR" dirty="0">
+                <a:solidFill>
+                  <a:schemeClr val="bg1"/>
+                </a:solidFill>
+              </a:rPr>
+              <a:t> no elemento</a:t>
+            </a:r>
+          </a:p>
+          <a:p>
+            <a:r>
+              <a:rPr lang="pt-BR" dirty="0">
+                <a:solidFill>
+                  <a:schemeClr val="bg1"/>
+                </a:solidFill>
+              </a:rPr>
+              <a:t>Entender a implementação de </a:t>
+            </a:r>
+            <a:r>
+              <a:rPr lang="pt-BR" i="1" dirty="0" err="1">
+                <a:solidFill>
+                  <a:schemeClr val="bg1"/>
+                </a:solidFill>
+              </a:rPr>
+              <a:t>style</a:t>
+            </a:r>
+            <a:r>
+              <a:rPr lang="pt-BR" i="1" dirty="0">
+                <a:solidFill>
+                  <a:schemeClr val="bg1"/>
+                </a:solidFill>
+              </a:rPr>
+              <a:t> </a:t>
+            </a:r>
+            <a:r>
+              <a:rPr lang="pt-BR" dirty="0">
+                <a:solidFill>
+                  <a:schemeClr val="bg1"/>
+                </a:solidFill>
+              </a:rPr>
+              <a:t>na página</a:t>
             </a:r>
           </a:p>
           <a:p>
@@ -4894,167 +5015,62 @@
           <a:lstStyle/>
           <a:p>
             <a:r>
+              <a:rPr lang="pt-BR" dirty="0">
+                <a:solidFill>
+                  <a:schemeClr val="bg1"/>
+                </a:solidFill>
+              </a:rPr>
+              <a:t>Entender funcionamento URL</a:t>
+            </a:r>
+          </a:p>
+        </p:txBody>
+      </p:sp>
+      <p:sp>
+        <p:nvSpPr>
+          <p:cNvPr id="3" name="Content Placeholder 2">
+            <a:extLst>
+              <a:ext uri="{FF2B5EF4-FFF2-40B4-BE49-F238E27FC236}">
+                <a16:creationId xmlns:a16="http://schemas.microsoft.com/office/drawing/2014/main" id="{CCC05246-A51A-0E7D-F216-FACE358C79E7}"/>
+              </a:ext>
+            </a:extLst>
+          </p:cNvPr>
+          <p:cNvSpPr>
+            <a:spLocks noGrp="1"/>
+          </p:cNvSpPr>
+          <p:nvPr>
+            <p:ph idx="1"/>
+          </p:nvPr>
+        </p:nvSpPr>
+        <p:spPr/>
+        <p:txBody>
+          <a:bodyPr>
+            <a:normAutofit/>
+          </a:bodyPr>
+          <a:lstStyle/>
+          <a:p>
+            <a:r>
+              <a:rPr lang="en-US" dirty="0">
+                <a:solidFill>
+                  <a:schemeClr val="bg1"/>
+                </a:solidFill>
+              </a:rPr>
+              <a:t>V</a:t>
+            </a:r>
+            <a:r>
               <a:rPr lang="pt-BR" dirty="0" err="1">
                 <a:solidFill>
                   <a:schemeClr val="bg1"/>
                 </a:solidFill>
               </a:rPr>
-              <a:t>INtrodução</a:t>
-            </a:r>
-            <a:endParaRPr lang="pt-BR" dirty="0">
-              <a:solidFill>
-                <a:schemeClr val="bg1"/>
-              </a:solidFill>
-            </a:endParaRPr>
-          </a:p>
-        </p:txBody>
-      </p:sp>
-      <p:sp>
-        <p:nvSpPr>
-          <p:cNvPr id="3" name="Content Placeholder 2">
-            <a:extLst>
-              <a:ext uri="{FF2B5EF4-FFF2-40B4-BE49-F238E27FC236}">
-                <a16:creationId xmlns:a16="http://schemas.microsoft.com/office/drawing/2014/main" id="{CCC05246-A51A-0E7D-F216-FACE358C79E7}"/>
-              </a:ext>
-            </a:extLst>
-          </p:cNvPr>
-          <p:cNvSpPr>
-            <a:spLocks noGrp="1"/>
-          </p:cNvSpPr>
-          <p:nvPr>
-            <p:ph idx="1"/>
-          </p:nvPr>
-        </p:nvSpPr>
-        <p:spPr/>
-        <p:txBody>
-          <a:bodyPr>
-            <a:normAutofit/>
-          </a:bodyPr>
-          <a:lstStyle/>
-          <a:p>
+              <a:t>er</a:t>
+            </a:r>
             <a:r>
               <a:rPr lang="pt-BR" dirty="0">
                 <a:solidFill>
                   <a:schemeClr val="bg1"/>
                 </a:solidFill>
               </a:rPr>
-              <a:t>HTML não é linguagem de programação e sim linguagem de marcação.</a:t>
-            </a:r>
-          </a:p>
-          <a:p>
-            <a:r>
-              <a:rPr lang="pt-BR" dirty="0">
-                <a:solidFill>
-                  <a:schemeClr val="bg1"/>
-                </a:solidFill>
-              </a:rPr>
-              <a:t>Composta por elementos predefinidos chamados </a:t>
-            </a:r>
-            <a:r>
-              <a:rPr lang="pt-BR" dirty="0" err="1">
-                <a:solidFill>
-                  <a:schemeClr val="bg1"/>
-                </a:solidFill>
-              </a:rPr>
-              <a:t>TAGs</a:t>
-            </a:r>
-            <a:endParaRPr lang="pt-BR" dirty="0">
-              <a:solidFill>
-                <a:schemeClr val="bg1"/>
-              </a:solidFill>
-            </a:endParaRPr>
-          </a:p>
-          <a:p>
-            <a:pPr lvl="1"/>
-            <a:r>
-              <a:rPr lang="pt-BR" dirty="0">
-                <a:solidFill>
-                  <a:schemeClr val="bg1"/>
-                </a:solidFill>
-              </a:rPr>
-              <a:t>Elemento é composto por tudo que existe entre a abertura da TAG e seu fechamento.</a:t>
-            </a:r>
-          </a:p>
-          <a:p>
-            <a:pPr lvl="1"/>
-            <a:endParaRPr lang="pt-BR" dirty="0">
-              <a:solidFill>
-                <a:schemeClr val="bg1"/>
-              </a:solidFill>
-            </a:endParaRPr>
-          </a:p>
-          <a:p>
-            <a:pPr lvl="1"/>
-            <a:r>
-              <a:rPr lang="pt-BR" dirty="0">
-                <a:solidFill>
-                  <a:schemeClr val="bg1"/>
-                </a:solidFill>
-              </a:rPr>
-              <a:t>TAG com conteúdo</a:t>
-            </a:r>
-          </a:p>
-          <a:p>
-            <a:pPr marL="914400" lvl="2" indent="0">
-              <a:buNone/>
-            </a:pPr>
-            <a:r>
-              <a:rPr lang="pt-BR" dirty="0">
-                <a:solidFill>
-                  <a:schemeClr val="bg1"/>
-                </a:solidFill>
-              </a:rPr>
-              <a:t>&lt;p&gt;A TAG “p” identifica um parágrafo&lt;/p&gt;</a:t>
-            </a:r>
-          </a:p>
-          <a:p>
-            <a:pPr marL="914400" lvl="2" indent="0">
-              <a:buNone/>
-            </a:pPr>
-            <a:endParaRPr lang="pt-BR" dirty="0">
-              <a:solidFill>
-                <a:schemeClr val="bg1"/>
-              </a:solidFill>
-            </a:endParaRPr>
-          </a:p>
-          <a:p>
-            <a:pPr lvl="1"/>
-            <a:r>
-              <a:rPr lang="pt-BR" dirty="0">
-                <a:solidFill>
-                  <a:schemeClr val="bg1"/>
-                </a:solidFill>
-              </a:rPr>
-              <a:t>TAG sem conteúdo</a:t>
-            </a:r>
-          </a:p>
-          <a:p>
-            <a:pPr marL="914400" lvl="2" indent="0">
-              <a:buNone/>
-            </a:pPr>
-            <a:r>
-              <a:rPr lang="pt-BR" dirty="0">
-                <a:solidFill>
-                  <a:schemeClr val="bg1"/>
-                </a:solidFill>
-              </a:rPr>
-              <a:t>&lt;</a:t>
-            </a:r>
-            <a:r>
-              <a:rPr lang="pt-BR" dirty="0" err="1">
-                <a:solidFill>
-                  <a:schemeClr val="bg1"/>
-                </a:solidFill>
-              </a:rPr>
-              <a:t>br</a:t>
-            </a:r>
-            <a:r>
-              <a:rPr lang="pt-BR" dirty="0">
-                <a:solidFill>
-                  <a:schemeClr val="bg1"/>
-                </a:solidFill>
-              </a:rPr>
-              <a:t>&gt;</a:t>
+              <a:t> imagem no site</a:t>
             </a:r>
           </a:p>
         </p:txBody>
@@ -5063,895 +5079,6 @@
     <p:extLst>
       <p:ext uri="{BB962C8B-B14F-4D97-AF65-F5344CB8AC3E}">
         <p14:creationId xmlns:p14="http://schemas.microsoft.com/office/powerpoint/2010/main" val="144921189"/>
-      </p:ext>
-    </p:extLst>
-  </p:cSld>
-  <p:clrMapOvr>
-    <a:masterClrMapping/>
-  </p:clrMapOvr>
-</p:sld>
-</file>
-
-<file path=ppt/slides/slide4.xml><?xml version="1.0" encoding="utf-8"?>
-<p:sld xmlns:a="http://schemas.openxmlformats.org/drawingml/2006/main" xmlns:r="http://schemas.openxmlformats.org/officeDocument/2006/relationships" xmlns:p="http://schemas.openxmlformats.org/presentationml/2006/main">
-  <p:cSld>
-    <p:bg>
-      <p:bgPr>
-        <a:solidFill>
-          <a:schemeClr val="tx1"/>
-        </a:solidFill>
-        <a:effectLst/>
-      </p:bgPr>
-    </p:bg>
-    <p:spTree>
-      <p:nvGrpSpPr>
-        <p:cNvPr id="1" name=""/>
-        <p:cNvGrpSpPr/>
-        <p:nvPr/>
-      </p:nvGrpSpPr>
-      <p:grpSpPr>
-        <a:xfrm>
-          <a:off x="0" y="0"/>
-          <a:ext cx="0" cy="0"/>
-          <a:chOff x="0" y="0"/>
-          <a:chExt cx="0" cy="0"/>
-        </a:xfrm>
-      </p:grpSpPr>
-      <p:sp>
-        <p:nvSpPr>
-          <p:cNvPr id="2" name="Title 1">
-            <a:extLst>
-              <a:ext uri="{FF2B5EF4-FFF2-40B4-BE49-F238E27FC236}">
-                <a16:creationId xmlns:a16="http://schemas.microsoft.com/office/drawing/2014/main" id="{51101A3E-FBA4-0FB6-1BFF-5144D2DBF77D}"/>
-              </a:ext>
-            </a:extLst>
-          </p:cNvPr>
-          <p:cNvSpPr>
-            <a:spLocks noGrp="1"/>
-          </p:cNvSpPr>
-          <p:nvPr>
-            <p:ph type="title"/>
-          </p:nvPr>
-        </p:nvSpPr>
-        <p:spPr/>
-        <p:txBody>
-          <a:bodyPr/>
-          <a:lstStyle/>
-          <a:p>
-            <a:r>
-              <a:rPr lang="pt-BR" dirty="0">
-                <a:solidFill>
-                  <a:schemeClr val="bg1"/>
-                </a:solidFill>
-              </a:rPr>
-              <a:t>Evolução</a:t>
-            </a:r>
-          </a:p>
-        </p:txBody>
-      </p:sp>
-      <p:sp>
-        <p:nvSpPr>
-          <p:cNvPr id="3" name="Content Placeholder 2">
-            <a:extLst>
-              <a:ext uri="{FF2B5EF4-FFF2-40B4-BE49-F238E27FC236}">
-                <a16:creationId xmlns:a16="http://schemas.microsoft.com/office/drawing/2014/main" id="{CCC05246-A51A-0E7D-F216-FACE358C79E7}"/>
-              </a:ext>
-            </a:extLst>
-          </p:cNvPr>
-          <p:cNvSpPr>
-            <a:spLocks noGrp="1"/>
-          </p:cNvSpPr>
-          <p:nvPr>
-            <p:ph idx="1"/>
-          </p:nvPr>
-        </p:nvSpPr>
-        <p:spPr/>
-        <p:txBody>
-          <a:bodyPr/>
-          <a:lstStyle/>
-          <a:p>
-            <a:endParaRPr lang="pt-BR" dirty="0">
-              <a:solidFill>
-                <a:schemeClr val="bg1"/>
-              </a:solidFill>
-            </a:endParaRPr>
-          </a:p>
-          <a:p>
-            <a:r>
-              <a:rPr lang="pt-BR" dirty="0">
-                <a:solidFill>
-                  <a:schemeClr val="bg1"/>
-                </a:solidFill>
-              </a:rPr>
-              <a:t>Atualmente usamos a versão 5.2 do HTML que foi lançada em 2017</a:t>
-            </a:r>
-          </a:p>
-          <a:p>
-            <a:endParaRPr lang="pt-BR" dirty="0">
-              <a:solidFill>
-                <a:schemeClr val="bg1"/>
-              </a:solidFill>
-            </a:endParaRPr>
-          </a:p>
-          <a:p>
-            <a:r>
-              <a:rPr lang="pt-BR" dirty="0">
-                <a:solidFill>
-                  <a:schemeClr val="bg1"/>
-                </a:solidFill>
-              </a:rPr>
-              <a:t>https://www.hostinger.com.br/tutoriais/wp-content/uploads/sites/12/2022/10/image2-726x1024.png</a:t>
-            </a:r>
-          </a:p>
-          <a:p>
-            <a:pPr marL="0" indent="0">
-              <a:buNone/>
-            </a:pPr>
-            <a:endParaRPr lang="pt-BR" dirty="0">
-              <a:solidFill>
-                <a:schemeClr val="bg1"/>
-              </a:solidFill>
-            </a:endParaRPr>
-          </a:p>
-        </p:txBody>
-      </p:sp>
-    </p:spTree>
-    <p:extLst>
-      <p:ext uri="{BB962C8B-B14F-4D97-AF65-F5344CB8AC3E}">
-        <p14:creationId xmlns:p14="http://schemas.microsoft.com/office/powerpoint/2010/main" val="308999456"/>
-      </p:ext>
-    </p:extLst>
-  </p:cSld>
-  <p:clrMapOvr>
-    <a:masterClrMapping/>
-  </p:clrMapOvr>
-</p:sld>
-</file>
-
-<file path=ppt/slides/slide5.xml><?xml version="1.0" encoding="utf-8"?>
-<p:sld xmlns:a="http://schemas.openxmlformats.org/drawingml/2006/main" xmlns:r="http://schemas.openxmlformats.org/officeDocument/2006/relationships" xmlns:p="http://schemas.openxmlformats.org/presentationml/2006/main">
-  <p:cSld>
-    <p:bg>
-      <p:bgPr>
-        <a:solidFill>
-          <a:schemeClr val="tx1"/>
-        </a:solidFill>
-        <a:effectLst/>
-      </p:bgPr>
-    </p:bg>
-    <p:spTree>
-      <p:nvGrpSpPr>
-        <p:cNvPr id="1" name=""/>
-        <p:cNvGrpSpPr/>
-        <p:nvPr/>
-      </p:nvGrpSpPr>
-      <p:grpSpPr>
-        <a:xfrm>
-          <a:off x="0" y="0"/>
-          <a:ext cx="0" cy="0"/>
-          <a:chOff x="0" y="0"/>
-          <a:chExt cx="0" cy="0"/>
-        </a:xfrm>
-      </p:grpSpPr>
-      <p:sp>
-        <p:nvSpPr>
-          <p:cNvPr id="2" name="Title 1">
-            <a:extLst>
-              <a:ext uri="{FF2B5EF4-FFF2-40B4-BE49-F238E27FC236}">
-                <a16:creationId xmlns:a16="http://schemas.microsoft.com/office/drawing/2014/main" id="{51101A3E-FBA4-0FB6-1BFF-5144D2DBF77D}"/>
-              </a:ext>
-            </a:extLst>
-          </p:cNvPr>
-          <p:cNvSpPr>
-            <a:spLocks noGrp="1"/>
-          </p:cNvSpPr>
-          <p:nvPr>
-            <p:ph type="title"/>
-          </p:nvPr>
-        </p:nvSpPr>
-        <p:spPr/>
-        <p:txBody>
-          <a:bodyPr/>
-          <a:lstStyle/>
-          <a:p>
-            <a:r>
-              <a:rPr lang="pt-BR" dirty="0">
-                <a:solidFill>
-                  <a:schemeClr val="bg1"/>
-                </a:solidFill>
-              </a:rPr>
-              <a:t>Apresentação HTML5</a:t>
-            </a:r>
-          </a:p>
-        </p:txBody>
-      </p:sp>
-      <p:sp>
-        <p:nvSpPr>
-          <p:cNvPr id="3" name="Content Placeholder 2">
-            <a:extLst>
-              <a:ext uri="{FF2B5EF4-FFF2-40B4-BE49-F238E27FC236}">
-                <a16:creationId xmlns:a16="http://schemas.microsoft.com/office/drawing/2014/main" id="{CCC05246-A51A-0E7D-F216-FACE358C79E7}"/>
-              </a:ext>
-            </a:extLst>
-          </p:cNvPr>
-          <p:cNvSpPr>
-            <a:spLocks noGrp="1"/>
-          </p:cNvSpPr>
-          <p:nvPr>
-            <p:ph idx="1"/>
-          </p:nvPr>
-        </p:nvSpPr>
-        <p:spPr/>
-        <p:txBody>
-          <a:bodyPr/>
-          <a:lstStyle/>
-          <a:p>
-            <a:pPr marL="0" indent="0">
-              <a:buNone/>
-            </a:pPr>
-            <a:r>
-              <a:rPr lang="pt-BR" dirty="0">
-                <a:hlinkClick r:id="rId2"/>
-              </a:rPr>
-              <a:t>O Que é HTML5 e Quais Vantagens ele Traz para seu Site (hostinger.com.br)</a:t>
-            </a:r>
-            <a:endParaRPr lang="pt-BR" dirty="0">
-              <a:solidFill>
-                <a:schemeClr val="bg1"/>
-              </a:solidFill>
-            </a:endParaRPr>
-          </a:p>
-        </p:txBody>
-      </p:sp>
-    </p:spTree>
-    <p:extLst>
-      <p:ext uri="{BB962C8B-B14F-4D97-AF65-F5344CB8AC3E}">
-        <p14:creationId xmlns:p14="http://schemas.microsoft.com/office/powerpoint/2010/main" val="2276957301"/>
-      </p:ext>
-    </p:extLst>
-  </p:cSld>
-  <p:clrMapOvr>
-    <a:masterClrMapping/>
-  </p:clrMapOvr>
-</p:sld>
-</file>
-
-<file path=ppt/slides/slide6.xml><?xml version="1.0" encoding="utf-8"?>
-<p:sld xmlns:a="http://schemas.openxmlformats.org/drawingml/2006/main" xmlns:r="http://schemas.openxmlformats.org/officeDocument/2006/relationships" xmlns:p="http://schemas.openxmlformats.org/presentationml/2006/main">
-  <p:cSld>
-    <p:bg>
-      <p:bgPr>
-        <a:solidFill>
-          <a:schemeClr val="tx1"/>
-        </a:solidFill>
-        <a:effectLst/>
-      </p:bgPr>
-    </p:bg>
-    <p:spTree>
-      <p:nvGrpSpPr>
-        <p:cNvPr id="1" name=""/>
-        <p:cNvGrpSpPr/>
-        <p:nvPr/>
-      </p:nvGrpSpPr>
-      <p:grpSpPr>
-        <a:xfrm>
-          <a:off x="0" y="0"/>
-          <a:ext cx="0" cy="0"/>
-          <a:chOff x="0" y="0"/>
-          <a:chExt cx="0" cy="0"/>
-        </a:xfrm>
-      </p:grpSpPr>
-      <p:sp>
-        <p:nvSpPr>
-          <p:cNvPr id="2" name="Title 1">
-            <a:extLst>
-              <a:ext uri="{FF2B5EF4-FFF2-40B4-BE49-F238E27FC236}">
-                <a16:creationId xmlns:a16="http://schemas.microsoft.com/office/drawing/2014/main" id="{51101A3E-FBA4-0FB6-1BFF-5144D2DBF77D}"/>
-              </a:ext>
-            </a:extLst>
-          </p:cNvPr>
-          <p:cNvSpPr>
-            <a:spLocks noGrp="1"/>
-          </p:cNvSpPr>
-          <p:nvPr>
-            <p:ph type="title"/>
-          </p:nvPr>
-        </p:nvSpPr>
-        <p:spPr/>
-        <p:txBody>
-          <a:bodyPr/>
-          <a:lstStyle/>
-          <a:p>
-            <a:r>
-              <a:rPr lang="pt-BR" dirty="0">
-                <a:solidFill>
-                  <a:schemeClr val="bg1"/>
-                </a:solidFill>
-              </a:rPr>
-              <a:t>Estrutura do Documento</a:t>
-            </a:r>
-            <a:br>
-              <a:rPr lang="pt-BR" dirty="0">
-                <a:solidFill>
-                  <a:schemeClr val="bg1"/>
-                </a:solidFill>
-              </a:rPr>
-            </a:br>
-            <a:r>
-              <a:rPr lang="pt-BR" dirty="0" err="1">
-                <a:solidFill>
-                  <a:schemeClr val="bg1"/>
-                </a:solidFill>
-              </a:rPr>
-              <a:t>Doctypes</a:t>
-            </a:r>
-            <a:endParaRPr lang="pt-BR" dirty="0">
-              <a:solidFill>
-                <a:schemeClr val="bg1"/>
-              </a:solidFill>
-            </a:endParaRPr>
-          </a:p>
-        </p:txBody>
-      </p:sp>
-      <p:pic>
-        <p:nvPicPr>
-          <p:cNvPr id="6" name="Imagem 1" descr="imagem tipos de declaração doctype">
-            <a:extLst>
-              <a:ext uri="{FF2B5EF4-FFF2-40B4-BE49-F238E27FC236}">
-                <a16:creationId xmlns:a16="http://schemas.microsoft.com/office/drawing/2014/main" id="{29740649-FAB5-F7AA-236F-46067380B0DC}"/>
-              </a:ext>
-            </a:extLst>
-          </p:cNvPr>
-          <p:cNvPicPr>
-            <a:picLocks noChangeAspect="1"/>
-          </p:cNvPicPr>
-          <p:nvPr/>
-        </p:nvPicPr>
-        <p:blipFill>
-          <a:blip r:embed="rId2">
-            <a:extLst>
-              <a:ext uri="{28A0092B-C50C-407E-A947-70E740481C1C}">
-                <a14:useLocalDpi xmlns:a14="http://schemas.microsoft.com/office/drawing/2010/main" val="0"/>
-              </a:ext>
-            </a:extLst>
-          </a:blip>
-          <a:srcRect/>
-          <a:stretch>
-            <a:fillRect/>
-          </a:stretch>
-        </p:blipFill>
-        <p:spPr bwMode="auto">
-          <a:xfrm>
-            <a:off x="1142999" y="2024576"/>
-            <a:ext cx="10342831" cy="3940126"/>
-          </a:xfrm>
-          <a:prstGeom prst="rect">
-            <a:avLst/>
-          </a:prstGeom>
-          <a:noFill/>
-          <a:ln>
-            <a:noFill/>
-          </a:ln>
-        </p:spPr>
-      </p:pic>
-    </p:spTree>
-    <p:extLst>
-      <p:ext uri="{BB962C8B-B14F-4D97-AF65-F5344CB8AC3E}">
-        <p14:creationId xmlns:p14="http://schemas.microsoft.com/office/powerpoint/2010/main" val="913772843"/>
-      </p:ext>
-    </p:extLst>
-  </p:cSld>
-  <p:clrMapOvr>
-    <a:masterClrMapping/>
-  </p:clrMapOvr>
-</p:sld>
-</file>
-
-<file path=ppt/slides/slide7.xml><?xml version="1.0" encoding="utf-8"?>
-<p:sld xmlns:a="http://schemas.openxmlformats.org/drawingml/2006/main" xmlns:r="http://schemas.openxmlformats.org/officeDocument/2006/relationships" xmlns:p="http://schemas.openxmlformats.org/presentationml/2006/main">
-  <p:cSld>
-    <p:bg>
-      <p:bgPr>
-        <a:solidFill>
-          <a:schemeClr val="tx1"/>
-        </a:solidFill>
-        <a:effectLst/>
-      </p:bgPr>
-    </p:bg>
-    <p:spTree>
-      <p:nvGrpSpPr>
-        <p:cNvPr id="1" name=""/>
-        <p:cNvGrpSpPr/>
-        <p:nvPr/>
-      </p:nvGrpSpPr>
-      <p:grpSpPr>
-        <a:xfrm>
-          <a:off x="0" y="0"/>
-          <a:ext cx="0" cy="0"/>
-          <a:chOff x="0" y="0"/>
-          <a:chExt cx="0" cy="0"/>
-        </a:xfrm>
-      </p:grpSpPr>
-      <p:sp>
-        <p:nvSpPr>
-          <p:cNvPr id="2" name="Title 1">
-            <a:extLst>
-              <a:ext uri="{FF2B5EF4-FFF2-40B4-BE49-F238E27FC236}">
-                <a16:creationId xmlns:a16="http://schemas.microsoft.com/office/drawing/2014/main" id="{51101A3E-FBA4-0FB6-1BFF-5144D2DBF77D}"/>
-              </a:ext>
-            </a:extLst>
-          </p:cNvPr>
-          <p:cNvSpPr>
-            <a:spLocks noGrp="1"/>
-          </p:cNvSpPr>
-          <p:nvPr>
-            <p:ph type="title"/>
-          </p:nvPr>
-        </p:nvSpPr>
-        <p:spPr/>
-        <p:txBody>
-          <a:bodyPr/>
-          <a:lstStyle/>
-          <a:p>
-            <a:r>
-              <a:rPr lang="pt-BR" dirty="0" err="1">
-                <a:solidFill>
-                  <a:schemeClr val="bg1"/>
-                </a:solidFill>
-              </a:rPr>
-              <a:t>TAGs</a:t>
-            </a:r>
-            <a:r>
-              <a:rPr lang="pt-BR" dirty="0">
-                <a:solidFill>
-                  <a:schemeClr val="bg1"/>
-                </a:solidFill>
-              </a:rPr>
-              <a:t> e atributos</a:t>
-            </a:r>
-          </a:p>
-        </p:txBody>
-      </p:sp>
-      <p:sp>
-        <p:nvSpPr>
-          <p:cNvPr id="3" name="Content Placeholder 2">
-            <a:extLst>
-              <a:ext uri="{FF2B5EF4-FFF2-40B4-BE49-F238E27FC236}">
-                <a16:creationId xmlns:a16="http://schemas.microsoft.com/office/drawing/2014/main" id="{CCC05246-A51A-0E7D-F216-FACE358C79E7}"/>
-              </a:ext>
-            </a:extLst>
-          </p:cNvPr>
-          <p:cNvSpPr>
-            <a:spLocks noGrp="1"/>
-          </p:cNvSpPr>
-          <p:nvPr>
-            <p:ph idx="1"/>
-          </p:nvPr>
-        </p:nvSpPr>
-        <p:spPr/>
-        <p:txBody>
-          <a:bodyPr/>
-          <a:lstStyle/>
-          <a:p>
-            <a:r>
-              <a:rPr lang="pt-BR" dirty="0" err="1">
-                <a:solidFill>
-                  <a:schemeClr val="bg1"/>
-                </a:solidFill>
-              </a:rPr>
-              <a:t>TAGs</a:t>
-            </a:r>
-            <a:endParaRPr lang="pt-BR" dirty="0">
-              <a:solidFill>
-                <a:schemeClr val="bg1"/>
-              </a:solidFill>
-            </a:endParaRPr>
-          </a:p>
-          <a:p>
-            <a:pPr lvl="1"/>
-            <a:r>
-              <a:rPr lang="pt-BR" dirty="0">
-                <a:solidFill>
-                  <a:schemeClr val="bg1"/>
-                </a:solidFill>
-              </a:rPr>
-              <a:t>São palavras ou termos </a:t>
-            </a:r>
-            <a:r>
-              <a:rPr lang="pt-BR" dirty="0" err="1">
-                <a:solidFill>
-                  <a:schemeClr val="bg1"/>
-                </a:solidFill>
-              </a:rPr>
-              <a:t>usandos</a:t>
-            </a:r>
-            <a:r>
-              <a:rPr lang="pt-BR" dirty="0">
-                <a:solidFill>
-                  <a:schemeClr val="bg1"/>
-                </a:solidFill>
-              </a:rPr>
-              <a:t> entre os sinais de “&lt;“ e “&gt;”</a:t>
-            </a:r>
-          </a:p>
-          <a:p>
-            <a:pPr marL="457200" lvl="1" indent="0">
-              <a:buNone/>
-            </a:pPr>
-            <a:r>
-              <a:rPr lang="pt-BR" dirty="0">
-                <a:solidFill>
-                  <a:schemeClr val="bg1"/>
-                </a:solidFill>
-              </a:rPr>
-              <a:t>&lt;h1&gt;Este é o título de primeiro nível&lt;/h1&gt;</a:t>
-            </a:r>
-          </a:p>
-          <a:p>
-            <a:pPr marL="457200" lvl="1" indent="0">
-              <a:buNone/>
-            </a:pPr>
-            <a:endParaRPr lang="pt-BR" dirty="0">
-              <a:solidFill>
-                <a:schemeClr val="bg1"/>
-              </a:solidFill>
-            </a:endParaRPr>
-          </a:p>
-          <a:p>
-            <a:pPr marL="457200" lvl="1" indent="0">
-              <a:buNone/>
-            </a:pPr>
-            <a:r>
-              <a:rPr lang="pt-BR" dirty="0" err="1">
-                <a:solidFill>
-                  <a:schemeClr val="bg1"/>
-                </a:solidFill>
-              </a:rPr>
-              <a:t>TAGs</a:t>
-            </a:r>
-            <a:r>
-              <a:rPr lang="pt-BR" dirty="0">
-                <a:solidFill>
-                  <a:schemeClr val="bg1"/>
-                </a:solidFill>
-              </a:rPr>
-              <a:t> podem possuir atributos.</a:t>
-            </a:r>
-          </a:p>
-          <a:p>
-            <a:pPr marL="457200" lvl="1" indent="0">
-              <a:buNone/>
-            </a:pPr>
-            <a:r>
-              <a:rPr lang="pt-BR" dirty="0">
-                <a:solidFill>
-                  <a:schemeClr val="bg1"/>
-                </a:solidFill>
-              </a:rPr>
-              <a:t>&lt;</a:t>
-            </a:r>
-            <a:r>
-              <a:rPr lang="pt-BR" dirty="0" err="1">
-                <a:solidFill>
-                  <a:schemeClr val="bg1"/>
-                </a:solidFill>
-              </a:rPr>
-              <a:t>img</a:t>
-            </a:r>
-            <a:r>
-              <a:rPr lang="pt-BR" dirty="0">
-                <a:solidFill>
-                  <a:schemeClr val="bg1"/>
-                </a:solidFill>
-              </a:rPr>
-              <a:t> </a:t>
-            </a:r>
-            <a:r>
-              <a:rPr lang="pt-BR" dirty="0" err="1">
-                <a:solidFill>
-                  <a:schemeClr val="bg1"/>
-                </a:solidFill>
-              </a:rPr>
-              <a:t>source</a:t>
-            </a:r>
-            <a:r>
-              <a:rPr lang="pt-BR" dirty="0">
-                <a:solidFill>
-                  <a:schemeClr val="bg1"/>
-                </a:solidFill>
-              </a:rPr>
-              <a:t>=“caminho da imagem” </a:t>
-            </a:r>
-            <a:r>
-              <a:rPr lang="pt-BR" dirty="0" err="1">
-                <a:solidFill>
-                  <a:schemeClr val="bg1"/>
-                </a:solidFill>
-              </a:rPr>
-              <a:t>alt</a:t>
-            </a:r>
-            <a:r>
-              <a:rPr lang="pt-BR" dirty="0">
-                <a:solidFill>
-                  <a:schemeClr val="bg1"/>
-                </a:solidFill>
-              </a:rPr>
-              <a:t>=“Texto alternativo para a imagem”&gt;</a:t>
-            </a:r>
-          </a:p>
-        </p:txBody>
-      </p:sp>
-    </p:spTree>
-    <p:extLst>
-      <p:ext uri="{BB962C8B-B14F-4D97-AF65-F5344CB8AC3E}">
-        <p14:creationId xmlns:p14="http://schemas.microsoft.com/office/powerpoint/2010/main" val="3069868542"/>
-      </p:ext>
-    </p:extLst>
-  </p:cSld>
-  <p:clrMapOvr>
-    <a:masterClrMapping/>
-  </p:clrMapOvr>
-</p:sld>
-</file>
-
-<file path=ppt/slides/slide8.xml><?xml version="1.0" encoding="utf-8"?>
-<p:sld xmlns:a="http://schemas.openxmlformats.org/drawingml/2006/main" xmlns:r="http://schemas.openxmlformats.org/officeDocument/2006/relationships" xmlns:p="http://schemas.openxmlformats.org/presentationml/2006/main">
-  <p:cSld>
-    <p:bg>
-      <p:bgPr>
-        <a:solidFill>
-          <a:schemeClr val="tx1"/>
-        </a:solidFill>
-        <a:effectLst/>
-      </p:bgPr>
-    </p:bg>
-    <p:spTree>
-      <p:nvGrpSpPr>
-        <p:cNvPr id="1" name=""/>
-        <p:cNvGrpSpPr/>
-        <p:nvPr/>
-      </p:nvGrpSpPr>
-      <p:grpSpPr>
-        <a:xfrm>
-          <a:off x="0" y="0"/>
-          <a:ext cx="0" cy="0"/>
-          <a:chOff x="0" y="0"/>
-          <a:chExt cx="0" cy="0"/>
-        </a:xfrm>
-      </p:grpSpPr>
-      <p:sp>
-        <p:nvSpPr>
-          <p:cNvPr id="2" name="Title 1">
-            <a:extLst>
-              <a:ext uri="{FF2B5EF4-FFF2-40B4-BE49-F238E27FC236}">
-                <a16:creationId xmlns:a16="http://schemas.microsoft.com/office/drawing/2014/main" id="{51101A3E-FBA4-0FB6-1BFF-5144D2DBF77D}"/>
-              </a:ext>
-            </a:extLst>
-          </p:cNvPr>
-          <p:cNvSpPr>
-            <a:spLocks noGrp="1"/>
-          </p:cNvSpPr>
-          <p:nvPr>
-            <p:ph type="title"/>
-          </p:nvPr>
-        </p:nvSpPr>
-        <p:spPr/>
-        <p:txBody>
-          <a:bodyPr/>
-          <a:lstStyle/>
-          <a:p>
-            <a:r>
-              <a:rPr lang="pt-BR" dirty="0">
-                <a:solidFill>
-                  <a:schemeClr val="bg1"/>
-                </a:solidFill>
-              </a:rPr>
-              <a:t>Estrutura básica</a:t>
-            </a:r>
-          </a:p>
-        </p:txBody>
-      </p:sp>
-      <p:sp>
-        <p:nvSpPr>
-          <p:cNvPr id="3" name="Content Placeholder 2">
-            <a:extLst>
-              <a:ext uri="{FF2B5EF4-FFF2-40B4-BE49-F238E27FC236}">
-                <a16:creationId xmlns:a16="http://schemas.microsoft.com/office/drawing/2014/main" id="{CCC05246-A51A-0E7D-F216-FACE358C79E7}"/>
-              </a:ext>
-            </a:extLst>
-          </p:cNvPr>
-          <p:cNvSpPr>
-            <a:spLocks noGrp="1"/>
-          </p:cNvSpPr>
-          <p:nvPr>
-            <p:ph idx="1"/>
-          </p:nvPr>
-        </p:nvSpPr>
-        <p:spPr/>
-        <p:txBody>
-          <a:bodyPr/>
-          <a:lstStyle/>
-          <a:p>
-            <a:pPr marL="0" indent="0">
-              <a:buNone/>
-            </a:pPr>
-            <a:r>
-              <a:rPr lang="pt-BR" dirty="0">
-                <a:solidFill>
-                  <a:schemeClr val="bg1"/>
-                </a:solidFill>
-              </a:rPr>
-              <a:t>&lt;DOCTYPE </a:t>
-            </a:r>
-            <a:r>
-              <a:rPr lang="pt-BR" dirty="0" err="1">
-                <a:solidFill>
-                  <a:schemeClr val="bg1"/>
-                </a:solidFill>
-              </a:rPr>
-              <a:t>html</a:t>
-            </a:r>
-            <a:r>
-              <a:rPr lang="pt-BR" dirty="0">
-                <a:solidFill>
-                  <a:schemeClr val="bg1"/>
-                </a:solidFill>
-              </a:rPr>
-              <a:t>&gt;</a:t>
-            </a:r>
-          </a:p>
-          <a:p>
-            <a:pPr marL="0" indent="0">
-              <a:buNone/>
-            </a:pPr>
-            <a:r>
-              <a:rPr lang="pt-BR" dirty="0">
-                <a:solidFill>
-                  <a:schemeClr val="bg1"/>
-                </a:solidFill>
-              </a:rPr>
-              <a:t>&lt;</a:t>
-            </a:r>
-            <a:r>
-              <a:rPr lang="pt-BR" dirty="0" err="1">
-                <a:solidFill>
-                  <a:schemeClr val="bg1"/>
-                </a:solidFill>
-              </a:rPr>
-              <a:t>html</a:t>
-            </a:r>
-            <a:r>
-              <a:rPr lang="pt-BR" dirty="0">
-                <a:solidFill>
-                  <a:schemeClr val="bg1"/>
-                </a:solidFill>
-              </a:rPr>
-              <a:t>&gt;</a:t>
-            </a:r>
-          </a:p>
-          <a:p>
-            <a:pPr marL="0" indent="0">
-              <a:buNone/>
-            </a:pPr>
-            <a:r>
-              <a:rPr lang="pt-BR" dirty="0">
-                <a:solidFill>
-                  <a:schemeClr val="bg1"/>
-                </a:solidFill>
-              </a:rPr>
-              <a:t>  &lt;</a:t>
-            </a:r>
-            <a:r>
-              <a:rPr lang="pt-BR" dirty="0" err="1">
-                <a:solidFill>
-                  <a:schemeClr val="bg1"/>
-                </a:solidFill>
-              </a:rPr>
-              <a:t>head</a:t>
-            </a:r>
-            <a:r>
-              <a:rPr lang="pt-BR" dirty="0">
-                <a:solidFill>
-                  <a:schemeClr val="bg1"/>
-                </a:solidFill>
-              </a:rPr>
-              <a:t>&gt;</a:t>
-            </a:r>
-          </a:p>
-          <a:p>
-            <a:pPr marL="0" indent="0">
-              <a:buNone/>
-            </a:pPr>
-            <a:r>
-              <a:rPr lang="pt-BR" dirty="0">
-                <a:solidFill>
-                  <a:schemeClr val="bg1"/>
-                </a:solidFill>
-              </a:rPr>
-              <a:t>  &lt;/</a:t>
-            </a:r>
-            <a:r>
-              <a:rPr lang="pt-BR" dirty="0" err="1">
-                <a:solidFill>
-                  <a:schemeClr val="bg1"/>
-                </a:solidFill>
-              </a:rPr>
-              <a:t>head</a:t>
-            </a:r>
-            <a:r>
-              <a:rPr lang="pt-BR" dirty="0">
-                <a:solidFill>
-                  <a:schemeClr val="bg1"/>
-                </a:solidFill>
-              </a:rPr>
-              <a:t>&gt;</a:t>
-            </a:r>
-          </a:p>
-          <a:p>
-            <a:pPr marL="0" indent="0">
-              <a:buNone/>
-            </a:pPr>
-            <a:r>
-              <a:rPr lang="pt-BR" dirty="0">
-                <a:solidFill>
-                  <a:schemeClr val="bg1"/>
-                </a:solidFill>
-              </a:rPr>
-              <a:t>  &lt;body&gt;</a:t>
-            </a:r>
-            <a:br>
-              <a:rPr lang="pt-BR" dirty="0">
-                <a:solidFill>
-                  <a:schemeClr val="bg1"/>
-                </a:solidFill>
-              </a:rPr>
-            </a:br>
-            <a:r>
-              <a:rPr lang="pt-BR" dirty="0">
-                <a:solidFill>
-                  <a:schemeClr val="bg1"/>
-                </a:solidFill>
-              </a:rPr>
-              <a:t>  &lt;/body&gt;</a:t>
-            </a:r>
-            <a:br>
-              <a:rPr lang="pt-BR" dirty="0">
-                <a:solidFill>
-                  <a:schemeClr val="bg1"/>
-                </a:solidFill>
-              </a:rPr>
-            </a:br>
-            <a:r>
-              <a:rPr lang="pt-BR" dirty="0">
-                <a:solidFill>
-                  <a:schemeClr val="bg1"/>
-                </a:solidFill>
-              </a:rPr>
-              <a:t>&lt;/</a:t>
-            </a:r>
-            <a:r>
-              <a:rPr lang="pt-BR" dirty="0" err="1">
-                <a:solidFill>
-                  <a:schemeClr val="bg1"/>
-                </a:solidFill>
-              </a:rPr>
-              <a:t>html</a:t>
-            </a:r>
-            <a:r>
-              <a:rPr lang="pt-BR" dirty="0">
-                <a:solidFill>
-                  <a:schemeClr val="bg1"/>
-                </a:solidFill>
-              </a:rPr>
-              <a:t>&gt;</a:t>
-            </a:r>
-          </a:p>
-        </p:txBody>
-      </p:sp>
-    </p:spTree>
-    <p:extLst>
-      <p:ext uri="{BB962C8B-B14F-4D97-AF65-F5344CB8AC3E}">
-        <p14:creationId xmlns:p14="http://schemas.microsoft.com/office/powerpoint/2010/main" val="2830404820"/>
       </p:ext>
     </p:extLst>
   </p:cSld>

</xml_diff>

<commit_message>
Update material aula 03
</commit_message>
<xml_diff>
--- a/aula-03/material/Aula03.pptx
+++ b/aula-03/material/Aula03.pptx
@@ -8,6 +8,8 @@
     <p:sldId id="256" r:id="rId2"/>
     <p:sldId id="270" r:id="rId3"/>
     <p:sldId id="272" r:id="rId4"/>
+    <p:sldId id="273" r:id="rId5"/>
+    <p:sldId id="274" r:id="rId6"/>
   </p:sldIdLst>
   <p:sldSz cx="12192000" cy="6858000"/>
   <p:notesSz cx="6858000" cy="9144000"/>
@@ -114,6 +116,8 @@
             <p14:sldId id="256"/>
             <p14:sldId id="270"/>
             <p14:sldId id="272"/>
+            <p14:sldId id="273"/>
+            <p14:sldId id="274"/>
           </p14:sldIdLst>
         </p14:section>
       </p14:sectionLst>
@@ -4861,6 +4865,22 @@
             </a:r>
           </a:p>
           <a:p>
+            <a:pPr marL="457200" lvl="1" indent="0">
+              <a:buNone/>
+            </a:pPr>
+            <a:r>
+              <a:rPr lang="pt-BR" dirty="0">
+                <a:hlinkClick r:id="rId3"/>
+              </a:rPr>
+              <a:t>OqueAconteceQuandoDigitaURL.gif (800×973) (emersoninocente.github.io)</a:t>
+            </a:r>
+            <a:endParaRPr lang="pt-BR" dirty="0">
+              <a:solidFill>
+                <a:schemeClr val="bg1"/>
+              </a:solidFill>
+            </a:endParaRPr>
+          </a:p>
+          <a:p>
             <a:r>
               <a:rPr lang="pt-BR" dirty="0">
                 <a:solidFill>
@@ -4944,6 +4964,32 @@
                 </a:solidFill>
               </a:rPr>
               <a:t>na página</a:t>
+            </a:r>
+          </a:p>
+          <a:p>
+            <a:r>
+              <a:rPr lang="pt-BR" dirty="0">
+                <a:solidFill>
+                  <a:schemeClr val="bg1"/>
+                </a:solidFill>
+              </a:rPr>
+              <a:t>Entender a implementação de </a:t>
+            </a:r>
+            <a:r>
+              <a:rPr lang="pt-BR" i="1" dirty="0" err="1">
+                <a:solidFill>
+                  <a:schemeClr val="bg1"/>
+                </a:solidFill>
+              </a:rPr>
+              <a:t>style</a:t>
+            </a:r>
+            <a:r>
+              <a:rPr lang="pt-BR" dirty="0">
+                <a:solidFill>
+                  <a:schemeClr val="bg1"/>
+                </a:solidFill>
+              </a:rPr>
+              <a:t> usando arquivos externos</a:t>
             </a:r>
           </a:p>
           <a:p>
@@ -5020,7 +5066,106 @@
                   <a:schemeClr val="bg1"/>
                 </a:solidFill>
               </a:rPr>
-              <a:t>Entender funcionamento URL</a:t>
+              <a:t>Formatação de texto</a:t>
+            </a:r>
+          </a:p>
+        </p:txBody>
+      </p:sp>
+      <p:pic>
+        <p:nvPicPr>
+          <p:cNvPr id="5" name="Content Placeholder 4">
+            <a:extLst>
+              <a:ext uri="{FF2B5EF4-FFF2-40B4-BE49-F238E27FC236}">
+                <a16:creationId xmlns:a16="http://schemas.microsoft.com/office/drawing/2014/main" id="{492F8606-5F81-A180-497B-4CC1DC059E9B}"/>
+              </a:ext>
+            </a:extLst>
+          </p:cNvPr>
+          <p:cNvPicPr>
+            <a:picLocks noGrp="1" noChangeAspect="1"/>
+          </p:cNvPicPr>
+          <p:nvPr>
+            <p:ph idx="1"/>
+          </p:nvPr>
+        </p:nvPicPr>
+        <p:blipFill>
+          <a:blip r:embed="rId2"/>
+          <a:stretch>
+            <a:fillRect/>
+          </a:stretch>
+        </p:blipFill>
+        <p:spPr>
+          <a:xfrm>
+            <a:off x="2692159" y="1676615"/>
+            <a:ext cx="6807681" cy="5070548"/>
+          </a:xfrm>
+        </p:spPr>
+      </p:pic>
+    </p:spTree>
+    <p:extLst>
+      <p:ext uri="{BB962C8B-B14F-4D97-AF65-F5344CB8AC3E}">
+        <p14:creationId xmlns:p14="http://schemas.microsoft.com/office/powerpoint/2010/main" val="144921189"/>
+      </p:ext>
+    </p:extLst>
+  </p:cSld>
+  <p:clrMapOvr>
+    <a:masterClrMapping/>
+  </p:clrMapOvr>
+</p:sld>
+</file>
+
+<file path=ppt/slides/slide4.xml><?xml version="1.0" encoding="utf-8"?>
+<p:sld xmlns:a="http://schemas.openxmlformats.org/drawingml/2006/main" xmlns:r="http://schemas.openxmlformats.org/officeDocument/2006/relationships" xmlns:p="http://schemas.openxmlformats.org/presentationml/2006/main">
+  <p:cSld>
+    <p:bg>
+      <p:bgPr>
+        <a:solidFill>
+          <a:schemeClr val="tx1"/>
+        </a:solidFill>
+        <a:effectLst/>
+      </p:bgPr>
+    </p:bg>
+    <p:spTree>
+      <p:nvGrpSpPr>
+        <p:cNvPr id="1" name=""/>
+        <p:cNvGrpSpPr/>
+        <p:nvPr/>
+      </p:nvGrpSpPr>
+      <p:grpSpPr>
+        <a:xfrm>
+          <a:off x="0" y="0"/>
+          <a:ext cx="0" cy="0"/>
+          <a:chOff x="0" y="0"/>
+          <a:chExt cx="0" cy="0"/>
+        </a:xfrm>
+      </p:grpSpPr>
+      <p:sp>
+        <p:nvSpPr>
+          <p:cNvPr id="2" name="Title 1">
+            <a:extLst>
+              <a:ext uri="{FF2B5EF4-FFF2-40B4-BE49-F238E27FC236}">
+                <a16:creationId xmlns:a16="http://schemas.microsoft.com/office/drawing/2014/main" id="{51101A3E-FBA4-0FB6-1BFF-5144D2DBF77D}"/>
+              </a:ext>
+            </a:extLst>
+          </p:cNvPr>
+          <p:cNvSpPr>
+            <a:spLocks noGrp="1"/>
+          </p:cNvSpPr>
+          <p:nvPr>
+            <p:ph type="title"/>
+          </p:nvPr>
+        </p:nvSpPr>
+        <p:spPr/>
+        <p:txBody>
+          <a:bodyPr/>
+          <a:lstStyle/>
+          <a:p>
+            <a:r>
+              <a:rPr lang="pt-BR" dirty="0">
+                <a:solidFill>
+                  <a:schemeClr val="bg1"/>
+                </a:solidFill>
+              </a:rPr>
+              <a:t>Lista de referência - TAG</a:t>
             </a:r>
           </a:p>
         </p:txBody>
@@ -5048,37 +5193,321 @@
           </a:bodyPr>
           <a:lstStyle/>
           <a:p>
+            <a:pPr marL="0" indent="0">
+              <a:buNone/>
+            </a:pPr>
+            <a:r>
+              <a:rPr lang="pt-BR" dirty="0">
+                <a:hlinkClick r:id="rId2"/>
+              </a:rPr>
+              <a:t>HTML </a:t>
+            </a:r>
+            <a:r>
+              <a:rPr lang="pt-BR" dirty="0" err="1">
+                <a:hlinkClick r:id="rId2"/>
+              </a:rPr>
+              <a:t>Reference</a:t>
+            </a:r>
+            <a:r>
+              <a:rPr lang="pt-BR" dirty="0">
+                <a:hlinkClick r:id="rId2"/>
+              </a:rPr>
+              <a:t> (w3schools.com)</a:t>
+            </a:r>
+            <a:endParaRPr lang="pt-BR" dirty="0">
+              <a:solidFill>
+                <a:schemeClr val="bg1"/>
+              </a:solidFill>
+            </a:endParaRPr>
+          </a:p>
+        </p:txBody>
+      </p:sp>
+    </p:spTree>
+    <p:extLst>
+      <p:ext uri="{BB962C8B-B14F-4D97-AF65-F5344CB8AC3E}">
+        <p14:creationId xmlns:p14="http://schemas.microsoft.com/office/powerpoint/2010/main" val="1295603680"/>
+      </p:ext>
+    </p:extLst>
+  </p:cSld>
+  <p:clrMapOvr>
+    <a:masterClrMapping/>
+  </p:clrMapOvr>
+</p:sld>
+</file>
+
+<file path=ppt/slides/slide5.xml><?xml version="1.0" encoding="utf-8"?>
+<p:sld xmlns:a="http://schemas.openxmlformats.org/drawingml/2006/main" xmlns:r="http://schemas.openxmlformats.org/officeDocument/2006/relationships" xmlns:p="http://schemas.openxmlformats.org/presentationml/2006/main">
+  <p:cSld>
+    <p:bg>
+      <p:bgPr>
+        <a:solidFill>
+          <a:schemeClr val="tx1"/>
+        </a:solidFill>
+        <a:effectLst/>
+      </p:bgPr>
+    </p:bg>
+    <p:spTree>
+      <p:nvGrpSpPr>
+        <p:cNvPr id="1" name=""/>
+        <p:cNvGrpSpPr/>
+        <p:nvPr/>
+      </p:nvGrpSpPr>
+      <p:grpSpPr>
+        <a:xfrm>
+          <a:off x="0" y="0"/>
+          <a:ext cx="0" cy="0"/>
+          <a:chOff x="0" y="0"/>
+          <a:chExt cx="0" cy="0"/>
+        </a:xfrm>
+      </p:grpSpPr>
+      <p:sp>
+        <p:nvSpPr>
+          <p:cNvPr id="2" name="Title 1">
+            <a:extLst>
+              <a:ext uri="{FF2B5EF4-FFF2-40B4-BE49-F238E27FC236}">
+                <a16:creationId xmlns:a16="http://schemas.microsoft.com/office/drawing/2014/main" id="{51101A3E-FBA4-0FB6-1BFF-5144D2DBF77D}"/>
+              </a:ext>
+            </a:extLst>
+          </p:cNvPr>
+          <p:cNvSpPr>
+            <a:spLocks noGrp="1"/>
+          </p:cNvSpPr>
+          <p:nvPr>
+            <p:ph type="title"/>
+          </p:nvPr>
+        </p:nvSpPr>
+        <p:spPr/>
+        <p:txBody>
+          <a:bodyPr/>
+          <a:lstStyle/>
+          <a:p>
+            <a:r>
+              <a:rPr lang="pt-BR" dirty="0">
+                <a:solidFill>
+                  <a:schemeClr val="bg1"/>
+                </a:solidFill>
+              </a:rPr>
+              <a:t>Implementando estilos</a:t>
+            </a:r>
+          </a:p>
+        </p:txBody>
+      </p:sp>
+      <p:sp>
+        <p:nvSpPr>
+          <p:cNvPr id="3" name="Content Placeholder 2">
+            <a:extLst>
+              <a:ext uri="{FF2B5EF4-FFF2-40B4-BE49-F238E27FC236}">
+                <a16:creationId xmlns:a16="http://schemas.microsoft.com/office/drawing/2014/main" id="{CCC05246-A51A-0E7D-F216-FACE358C79E7}"/>
+              </a:ext>
+            </a:extLst>
+          </p:cNvPr>
+          <p:cNvSpPr>
+            <a:spLocks noGrp="1"/>
+          </p:cNvSpPr>
+          <p:nvPr>
+            <p:ph idx="1"/>
+          </p:nvPr>
+        </p:nvSpPr>
+        <p:spPr/>
+        <p:txBody>
+          <a:bodyPr>
+            <a:normAutofit/>
+          </a:bodyPr>
+          <a:lstStyle/>
+          <a:p>
+            <a:r>
+              <a:rPr lang="en-US" dirty="0" err="1">
+                <a:solidFill>
+                  <a:schemeClr val="bg1"/>
+                </a:solidFill>
+              </a:rPr>
+              <a:t>Estilos</a:t>
+            </a:r>
             <a:r>
               <a:rPr lang="en-US" dirty="0">
                 <a:solidFill>
                   <a:schemeClr val="bg1"/>
                 </a:solidFill>
               </a:rPr>
-              <a:t>V</a:t>
-            </a:r>
-            <a:r>
-              <a:rPr lang="pt-BR" dirty="0" err="1">
+              <a:t> </a:t>
+            </a:r>
+            <a:r>
+              <a:rPr lang="en-US" dirty="0" err="1">
                 <a:solidFill>
                   <a:schemeClr val="bg1"/>
                 </a:solidFill>
               </a:rPr>
-              <a:t>er</a:t>
-            </a:r>
-            <a:r>
-              <a:rPr lang="pt-BR" dirty="0">
+              <a:t>podem</a:t>
+            </a:r>
+            <a:r>
+              <a:rPr lang="en-US" dirty="0">
                 <a:solidFill>
                   <a:schemeClr val="bg1"/>
                 </a:solidFill>
               </a:rPr>
-              <a:t> imagem no site</a:t>
-            </a:r>
+              <a:t> ser </a:t>
+            </a:r>
+            <a:r>
+              <a:rPr lang="en-US" dirty="0" err="1">
+                <a:solidFill>
+                  <a:schemeClr val="bg1"/>
+                </a:solidFill>
+              </a:rPr>
+              <a:t>implementados</a:t>
+            </a:r>
+            <a:r>
+              <a:rPr lang="en-US" dirty="0">
+                <a:solidFill>
+                  <a:schemeClr val="bg1"/>
+                </a:solidFill>
+              </a:rPr>
+              <a:t> de 3 </a:t>
+            </a:r>
+            <a:r>
+              <a:rPr lang="en-US" dirty="0" err="1">
+                <a:solidFill>
+                  <a:schemeClr val="bg1"/>
+                </a:solidFill>
+              </a:rPr>
+              <a:t>formas</a:t>
+            </a:r>
+            <a:r>
+              <a:rPr lang="en-US" dirty="0">
+                <a:solidFill>
+                  <a:schemeClr val="bg1"/>
+                </a:solidFill>
+              </a:rPr>
+              <a:t>:</a:t>
+            </a:r>
+          </a:p>
+          <a:p>
+            <a:pPr lvl="1"/>
+            <a:r>
+              <a:rPr lang="en-US" dirty="0">
+                <a:solidFill>
+                  <a:schemeClr val="bg1"/>
+                </a:solidFill>
+              </a:rPr>
+              <a:t>No </a:t>
+            </a:r>
+            <a:r>
+              <a:rPr lang="en-US" dirty="0" err="1">
+                <a:solidFill>
+                  <a:schemeClr val="bg1"/>
+                </a:solidFill>
+              </a:rPr>
+              <a:t>elemento</a:t>
+            </a:r>
+            <a:endParaRPr lang="en-US" dirty="0">
+              <a:solidFill>
+                <a:schemeClr val="bg1"/>
+              </a:solidFill>
+            </a:endParaRPr>
+          </a:p>
+          <a:p>
+            <a:pPr lvl="1"/>
+            <a:r>
+              <a:rPr lang="en-US" dirty="0">
+                <a:solidFill>
+                  <a:schemeClr val="bg1"/>
+                </a:solidFill>
+              </a:rPr>
+              <a:t>Na </a:t>
+            </a:r>
+            <a:r>
+              <a:rPr lang="en-US" dirty="0" err="1">
+                <a:solidFill>
+                  <a:schemeClr val="bg1"/>
+                </a:solidFill>
+              </a:rPr>
+              <a:t>página</a:t>
+            </a:r>
+            <a:endParaRPr lang="en-US" dirty="0">
+              <a:solidFill>
+                <a:schemeClr val="bg1"/>
+              </a:solidFill>
+            </a:endParaRPr>
+          </a:p>
+          <a:p>
+            <a:pPr lvl="1"/>
+            <a:r>
+              <a:rPr lang="en-US" dirty="0" err="1">
+                <a:solidFill>
+                  <a:schemeClr val="bg1"/>
+                </a:solidFill>
+              </a:rPr>
+              <a:t>Usando</a:t>
+            </a:r>
+            <a:r>
+              <a:rPr lang="en-US" dirty="0">
+                <a:solidFill>
+                  <a:schemeClr val="bg1"/>
+                </a:solidFill>
+              </a:rPr>
+              <a:t> </a:t>
+            </a:r>
+            <a:r>
+              <a:rPr lang="en-US" dirty="0" err="1">
+                <a:solidFill>
+                  <a:schemeClr val="bg1"/>
+                </a:solidFill>
+              </a:rPr>
+              <a:t>arquivos</a:t>
+            </a:r>
+            <a:r>
+              <a:rPr lang="en-US" dirty="0">
+                <a:solidFill>
+                  <a:schemeClr val="bg1"/>
+                </a:solidFill>
+              </a:rPr>
+              <a:t> </a:t>
+            </a:r>
+            <a:r>
+              <a:rPr lang="en-US" dirty="0" err="1">
+                <a:solidFill>
+                  <a:schemeClr val="bg1"/>
+                </a:solidFill>
+              </a:rPr>
+              <a:t>externos</a:t>
+            </a:r>
+            <a:endParaRPr lang="en-US" dirty="0">
+              <a:solidFill>
+                <a:schemeClr val="bg1"/>
+              </a:solidFill>
+            </a:endParaRPr>
+          </a:p>
+          <a:p>
+            <a:pPr lvl="1"/>
+            <a:endParaRPr lang="en-US" dirty="0">
+              <a:solidFill>
+                <a:schemeClr val="bg1"/>
+              </a:solidFill>
+            </a:endParaRPr>
+          </a:p>
+          <a:p>
+            <a:pPr lvl="1"/>
+            <a:endParaRPr lang="en-US" dirty="0">
+              <a:solidFill>
+                <a:schemeClr val="bg1"/>
+              </a:solidFill>
+            </a:endParaRPr>
+          </a:p>
+          <a:p>
+            <a:pPr marL="457200" lvl="1" indent="0">
+              <a:buNone/>
+            </a:pPr>
+            <a:endParaRPr lang="pt-BR" dirty="0">
+              <a:solidFill>
+                <a:schemeClr val="bg1"/>
+              </a:solidFill>
+            </a:endParaRPr>
           </a:p>
         </p:txBody>
       </p:sp>
     </p:spTree>
     <p:extLst>
       <p:ext uri="{BB962C8B-B14F-4D97-AF65-F5344CB8AC3E}">
-        <p14:creationId xmlns:p14="http://schemas.microsoft.com/office/powerpoint/2010/main" val="144921189"/>
+        <p14:creationId xmlns:p14="http://schemas.microsoft.com/office/powerpoint/2010/main" val="3886150623"/>
       </p:ext>
     </p:extLst>
   </p:cSld>

</xml_diff>